<commit_message>
Revert "Update 0515 이연학.pptx"
This reverts commit 02f5b73bb89796ab6b58229aa681e736b50ca021.
</commit_message>
<xml_diff>
--- a/WebContent/lyh/0515 이연학.pptx
+++ b/WebContent/lyh/0515 이연학.pptx
@@ -26,20 +26,20 @@
       <p:bold r:id="rId12"/>
     </p:embeddedFont>
     <p:embeddedFont>
-      <p:font typeface="Calibri Light" pitchFamily="34" charset="0"/>
+      <p:font typeface="타이포_스톰 B" pitchFamily="18" charset="-127"/>
       <p:regular r:id="rId13"/>
-      <p:italic r:id="rId14"/>
-    </p:embeddedFont>
-    <p:embeddedFont>
-      <p:font typeface="타이포_스톰 B" pitchFamily="18" charset="-127"/>
-      <p:regular r:id="rId15"/>
     </p:embeddedFont>
     <p:embeddedFont>
       <p:font typeface="Calibri" pitchFamily="34" charset="0"/>
-      <p:regular r:id="rId16"/>
-      <p:bold r:id="rId17"/>
-      <p:italic r:id="rId18"/>
-      <p:boldItalic r:id="rId19"/>
+      <p:regular r:id="rId14"/>
+      <p:bold r:id="rId15"/>
+      <p:italic r:id="rId16"/>
+      <p:boldItalic r:id="rId17"/>
+    </p:embeddedFont>
+    <p:embeddedFont>
+      <p:font typeface="Calibri Light" pitchFamily="34" charset="0"/>
+      <p:regular r:id="rId18"/>
+      <p:italic r:id="rId19"/>
     </p:embeddedFont>
   </p:embeddedFontLst>
   <p:defaultTextStyle>
@@ -139,7 +139,7 @@
   </p:defaultTextStyle>
   <p:extLst>
     <p:ext uri="{EFAFB233-063F-42B5-8137-9DF3F51BA10A}">
-      <p15:sldGuideLst xmlns:p15="http://schemas.microsoft.com/office/powerpoint/2012/main" xmlns=""/>
+      <p15:sldGuideLst xmlns="" xmlns:p15="http://schemas.microsoft.com/office/powerpoint/2012/main"/>
     </p:ext>
   </p:extLst>
 </p:presentation>
@@ -493,90 +493,6 @@
     </a:lvl9pPr>
   </p:notesStyle>
 </p:notesMaster>
-</file>
-
-<file path=ppt/notesSlides/notesSlide1.xml><?xml version="1.0" encoding="utf-8"?>
-<p:notes xmlns:a="http://schemas.openxmlformats.org/drawingml/2006/main" xmlns:r="http://schemas.openxmlformats.org/officeDocument/2006/relationships" xmlns:p="http://schemas.openxmlformats.org/presentationml/2006/main">
-  <p:cSld>
-    <p:spTree>
-      <p:nvGrpSpPr>
-        <p:cNvPr id="1" name=""/>
-        <p:cNvGrpSpPr/>
-        <p:nvPr/>
-      </p:nvGrpSpPr>
-      <p:grpSpPr>
-        <a:xfrm>
-          <a:off x="0" y="0"/>
-          <a:ext cx="0" cy="0"/>
-          <a:chOff x="0" y="0"/>
-          <a:chExt cx="0" cy="0"/>
-        </a:xfrm>
-      </p:grpSpPr>
-      <p:sp>
-        <p:nvSpPr>
-          <p:cNvPr id="2" name="슬라이드 이미지 개체 틀 1"/>
-          <p:cNvSpPr>
-            <a:spLocks noGrp="1" noRot="1" noChangeAspect="1"/>
-          </p:cNvSpPr>
-          <p:nvPr>
-            <p:ph type="sldImg"/>
-          </p:nvPr>
-        </p:nvSpPr>
-        <p:spPr/>
-      </p:sp>
-      <p:sp>
-        <p:nvSpPr>
-          <p:cNvPr id="3" name="슬라이드 노트 개체 틀 2"/>
-          <p:cNvSpPr>
-            <a:spLocks noGrp="1"/>
-          </p:cNvSpPr>
-          <p:nvPr>
-            <p:ph type="body" idx="1"/>
-          </p:nvPr>
-        </p:nvSpPr>
-        <p:spPr/>
-        <p:txBody>
-          <a:bodyPr/>
-          <a:lstStyle/>
-          <a:p>
-            <a:endParaRPr lang="ko-KR" altLang="en-US" dirty="0"/>
-          </a:p>
-        </p:txBody>
-      </p:sp>
-      <p:sp>
-        <p:nvSpPr>
-          <p:cNvPr id="4" name="슬라이드 번호 개체 틀 3"/>
-          <p:cNvSpPr>
-            <a:spLocks noGrp="1"/>
-          </p:cNvSpPr>
-          <p:nvPr>
-            <p:ph type="sldNum" sz="quarter" idx="10"/>
-          </p:nvPr>
-        </p:nvSpPr>
-        <p:spPr/>
-        <p:txBody>
-          <a:bodyPr/>
-          <a:lstStyle/>
-          <a:p>
-            <a:fld id="{9CEE9E92-FDD1-4DC3-860A-956C9F2D4B87}" type="slidenum">
-              <a:rPr lang="ko-KR" altLang="en-US" smtClean="0"/>
-              <a:t>3</a:t>
-            </a:fld>
-            <a:endParaRPr lang="ko-KR" altLang="en-US"/>
-          </a:p>
-        </p:txBody>
-      </p:sp>
-    </p:spTree>
-    <p:extLst>
-      <p:ext uri="{BB962C8B-B14F-4D97-AF65-F5344CB8AC3E}">
-        <p14:creationId xmlns:p14="http://schemas.microsoft.com/office/powerpoint/2010/main" val="970439241"/>
-      </p:ext>
-    </p:extLst>
-  </p:cSld>
-  <p:clrMapOvr>
-    <a:masterClrMapping/>
-  </p:clrMapOvr>
-</p:notes>
 </file>
 
 <file path=ppt/slideLayouts/slideLayout1.xml><?xml version="1.0" encoding="utf-8"?>
@@ -8507,7 +8423,7 @@
         </p:nvGrpSpPr>
         <p:grpSpPr>
           <a:xfrm>
-            <a:off x="-4118" y="424917"/>
+            <a:off x="-4118" y="445699"/>
             <a:ext cx="9144000" cy="6380205"/>
             <a:chOff x="0" y="477795"/>
             <a:chExt cx="9144000" cy="6380205"/>
@@ -8780,7 +8696,7 @@
           <p:nvPr/>
         </p:nvPicPr>
         <p:blipFill>
-          <a:blip r:embed="rId3">
+          <a:blip r:embed="rId2">
             <a:extLst>
               <a:ext uri="{28A0092B-C50C-407E-A947-70E740481C1C}">
                 <a14:useLocalDpi xmlns:a14="http://schemas.microsoft.com/office/drawing/2010/main" val="0"/>
@@ -8796,326 +8712,6 @@
           <a:xfrm>
             <a:off x="217978" y="1638819"/>
             <a:ext cx="6290477" cy="3826800"/>
-          </a:xfrm>
-          <a:prstGeom prst="rect">
-            <a:avLst/>
-          </a:prstGeom>
-          <a:noFill/>
-          <a:extLst>
-            <a:ext uri="{909E8E84-426E-40DD-AFC4-6F175D3DCCD1}">
-              <a14:hiddenFill xmlns:a14="http://schemas.microsoft.com/office/drawing/2010/main">
-                <a:solidFill>
-                  <a:srgbClr val="FFFFFF"/>
-                </a:solidFill>
-              </a14:hiddenFill>
-            </a:ext>
-          </a:extLst>
-        </p:spPr>
-      </p:pic>
-      <p:cxnSp>
-        <p:nvCxnSpPr>
-          <p:cNvPr id="11" name="꺾인 연결선 10"/>
-          <p:cNvCxnSpPr/>
-          <p:nvPr/>
-        </p:nvCxnSpPr>
-        <p:spPr>
-          <a:xfrm rot="10800000" flipV="1">
-            <a:off x="4887312" y="5265417"/>
-            <a:ext cx="618815" cy="320043"/>
-          </a:xfrm>
-          <a:prstGeom prst="bentConnector3">
-            <a:avLst/>
-          </a:prstGeom>
-          <a:ln>
-            <a:tailEnd type="arrow"/>
-          </a:ln>
-        </p:spPr>
-        <p:style>
-          <a:lnRef idx="1">
-            <a:schemeClr val="accent1"/>
-          </a:lnRef>
-          <a:fillRef idx="0">
-            <a:schemeClr val="accent1"/>
-          </a:fillRef>
-          <a:effectRef idx="0">
-            <a:schemeClr val="accent1"/>
-          </a:effectRef>
-          <a:fontRef idx="minor">
-            <a:schemeClr val="tx1"/>
-          </a:fontRef>
-        </p:style>
-      </p:cxnSp>
-      <p:pic>
-        <p:nvPicPr>
-          <p:cNvPr id="1029" name="Picture 5" descr="C:\Users\508-19\Desktop\등록...PNG"/>
-          <p:cNvPicPr>
-            <a:picLocks noChangeAspect="1" noChangeArrowheads="1"/>
-          </p:cNvPicPr>
-          <p:nvPr/>
-        </p:nvPicPr>
-        <p:blipFill>
-          <a:blip r:embed="rId4">
-            <a:extLst>
-              <a:ext uri="{28A0092B-C50C-407E-A947-70E740481C1C}">
-                <a14:useLocalDpi xmlns:a14="http://schemas.microsoft.com/office/drawing/2010/main" val="0"/>
-              </a:ext>
-            </a:extLst>
-          </a:blip>
-          <a:srcRect/>
-          <a:stretch>
-            <a:fillRect/>
-          </a:stretch>
-        </p:blipFill>
-        <p:spPr bwMode="auto">
-          <a:xfrm>
-            <a:off x="1022600" y="5465619"/>
-            <a:ext cx="3790950" cy="228600"/>
-          </a:xfrm>
-          <a:prstGeom prst="rect">
-            <a:avLst/>
-          </a:prstGeom>
-          <a:noFill/>
-          <a:extLst>
-            <a:ext uri="{909E8E84-426E-40DD-AFC4-6F175D3DCCD1}">
-              <a14:hiddenFill xmlns:a14="http://schemas.microsoft.com/office/drawing/2010/main">
-                <a:solidFill>
-                  <a:srgbClr val="FFFFFF"/>
-                </a:solidFill>
-              </a14:hiddenFill>
-            </a:ext>
-          </a:extLst>
-        </p:spPr>
-      </p:pic>
-      <p:pic>
-        <p:nvPicPr>
-          <p:cNvPr id="1030" name="Picture 6" descr="C:\Users\508-19\Desktop\ㅇㅅㅌ.PNG"/>
-          <p:cNvPicPr>
-            <a:picLocks noChangeAspect="1" noChangeArrowheads="1"/>
-          </p:cNvPicPr>
-          <p:nvPr/>
-        </p:nvPicPr>
-        <p:blipFill>
-          <a:blip r:embed="rId5">
-            <a:extLst>
-              <a:ext uri="{28A0092B-C50C-407E-A947-70E740481C1C}">
-                <a14:useLocalDpi xmlns:a14="http://schemas.microsoft.com/office/drawing/2010/main" val="0"/>
-              </a:ext>
-            </a:extLst>
-          </a:blip>
-          <a:srcRect/>
-          <a:stretch>
-            <a:fillRect/>
-          </a:stretch>
-        </p:blipFill>
-        <p:spPr bwMode="auto">
-          <a:xfrm>
-            <a:off x="994025" y="5916778"/>
-            <a:ext cx="3819525" cy="419100"/>
-          </a:xfrm>
-          <a:prstGeom prst="rect">
-            <a:avLst/>
-          </a:prstGeom>
-          <a:noFill/>
-          <a:extLst>
-            <a:ext uri="{909E8E84-426E-40DD-AFC4-6F175D3DCCD1}">
-              <a14:hiddenFill xmlns:a14="http://schemas.microsoft.com/office/drawing/2010/main">
-                <a:solidFill>
-                  <a:srgbClr val="FFFFFF"/>
-                </a:solidFill>
-              </a14:hiddenFill>
-            </a:ext>
-          </a:extLst>
-        </p:spPr>
-      </p:pic>
-      <p:pic>
-        <p:nvPicPr>
-          <p:cNvPr id="1031" name="Picture 7" descr="C:\Users\508-19\Desktop\11.PNG"/>
-          <p:cNvPicPr>
-            <a:picLocks noChangeAspect="1" noChangeArrowheads="1"/>
-          </p:cNvPicPr>
-          <p:nvPr/>
-        </p:nvPicPr>
-        <p:blipFill>
-          <a:blip r:embed="rId6">
-            <a:extLst>
-              <a:ext uri="{28A0092B-C50C-407E-A947-70E740481C1C}">
-                <a14:useLocalDpi xmlns:a14="http://schemas.microsoft.com/office/drawing/2010/main" val="0"/>
-              </a:ext>
-            </a:extLst>
-          </a:blip>
-          <a:srcRect/>
-          <a:stretch>
-            <a:fillRect/>
-          </a:stretch>
-        </p:blipFill>
-        <p:spPr bwMode="auto">
-          <a:xfrm>
-            <a:off x="6359355" y="2163325"/>
-            <a:ext cx="2686050" cy="257175"/>
-          </a:xfrm>
-          <a:prstGeom prst="rect">
-            <a:avLst/>
-          </a:prstGeom>
-          <a:noFill/>
-          <a:extLst>
-            <a:ext uri="{909E8E84-426E-40DD-AFC4-6F175D3DCCD1}">
-              <a14:hiddenFill xmlns:a14="http://schemas.microsoft.com/office/drawing/2010/main">
-                <a:solidFill>
-                  <a:srgbClr val="FFFFFF"/>
-                </a:solidFill>
-              </a14:hiddenFill>
-            </a:ext>
-          </a:extLst>
-        </p:spPr>
-      </p:pic>
-      <p:pic>
-        <p:nvPicPr>
-          <p:cNvPr id="1032" name="Picture 8" descr="C:\Users\508-19\Desktop\22.PNG"/>
-          <p:cNvPicPr>
-            <a:picLocks noChangeAspect="1" noChangeArrowheads="1"/>
-          </p:cNvPicPr>
-          <p:nvPr/>
-        </p:nvPicPr>
-        <p:blipFill>
-          <a:blip r:embed="rId7">
-            <a:extLst>
-              <a:ext uri="{28A0092B-C50C-407E-A947-70E740481C1C}">
-                <a14:useLocalDpi xmlns:a14="http://schemas.microsoft.com/office/drawing/2010/main" val="0"/>
-              </a:ext>
-            </a:extLst>
-          </a:blip>
-          <a:srcRect/>
-          <a:stretch>
-            <a:fillRect/>
-          </a:stretch>
-        </p:blipFill>
-        <p:spPr bwMode="auto">
-          <a:xfrm>
-            <a:off x="6359355" y="2469219"/>
-            <a:ext cx="2714625" cy="238125"/>
-          </a:xfrm>
-          <a:prstGeom prst="rect">
-            <a:avLst/>
-          </a:prstGeom>
-          <a:noFill/>
-          <a:extLst>
-            <a:ext uri="{909E8E84-426E-40DD-AFC4-6F175D3DCCD1}">
-              <a14:hiddenFill xmlns:a14="http://schemas.microsoft.com/office/drawing/2010/main">
-                <a:solidFill>
-                  <a:srgbClr val="FFFFFF"/>
-                </a:solidFill>
-              </a14:hiddenFill>
-            </a:ext>
-          </a:extLst>
-        </p:spPr>
-      </p:pic>
-      <p:pic>
-        <p:nvPicPr>
-          <p:cNvPr id="1033" name="Picture 9" descr="C:\Users\508-19\Desktop\ㄹ.PNG"/>
-          <p:cNvPicPr>
-            <a:picLocks noChangeAspect="1" noChangeArrowheads="1"/>
-          </p:cNvPicPr>
-          <p:nvPr/>
-        </p:nvPicPr>
-        <p:blipFill>
-          <a:blip r:embed="rId8">
-            <a:extLst>
-              <a:ext uri="{28A0092B-C50C-407E-A947-70E740481C1C}">
-                <a14:useLocalDpi xmlns:a14="http://schemas.microsoft.com/office/drawing/2010/main" val="0"/>
-              </a:ext>
-            </a:extLst>
-          </a:blip>
-          <a:srcRect/>
-          <a:stretch>
-            <a:fillRect/>
-          </a:stretch>
-        </p:blipFill>
-        <p:spPr bwMode="auto">
-          <a:xfrm>
-            <a:off x="1610218" y="3122065"/>
-            <a:ext cx="857250" cy="209550"/>
-          </a:xfrm>
-          <a:prstGeom prst="rect">
-            <a:avLst/>
-          </a:prstGeom>
-          <a:noFill/>
-          <a:extLst>
-            <a:ext uri="{909E8E84-426E-40DD-AFC4-6F175D3DCCD1}">
-              <a14:hiddenFill xmlns:a14="http://schemas.microsoft.com/office/drawing/2010/main">
-                <a:solidFill>
-                  <a:srgbClr val="FFFFFF"/>
-                </a:solidFill>
-              </a14:hiddenFill>
-            </a:ext>
-          </a:extLst>
-        </p:spPr>
-      </p:pic>
-      <p:pic>
-        <p:nvPicPr>
-          <p:cNvPr id="1034" name="Picture 10" descr="C:\Users\508-19\Desktop\ㅡㅜㅐ.PNG"/>
-          <p:cNvPicPr>
-            <a:picLocks noChangeAspect="1" noChangeArrowheads="1"/>
-          </p:cNvPicPr>
-          <p:nvPr/>
-        </p:nvPicPr>
-        <p:blipFill>
-          <a:blip r:embed="rId9">
-            <a:extLst>
-              <a:ext uri="{28A0092B-C50C-407E-A947-70E740481C1C}">
-                <a14:useLocalDpi xmlns:a14="http://schemas.microsoft.com/office/drawing/2010/main" val="0"/>
-              </a:ext>
-            </a:extLst>
-          </a:blip>
-          <a:srcRect/>
-          <a:stretch>
-            <a:fillRect/>
-          </a:stretch>
-        </p:blipFill>
-        <p:spPr bwMode="auto">
-          <a:xfrm>
-            <a:off x="3363216" y="2745828"/>
-            <a:ext cx="581025" cy="228600"/>
-          </a:xfrm>
-          <a:prstGeom prst="rect">
-            <a:avLst/>
-          </a:prstGeom>
-          <a:noFill/>
-          <a:extLst>
-            <a:ext uri="{909E8E84-426E-40DD-AFC4-6F175D3DCCD1}">
-              <a14:hiddenFill xmlns:a14="http://schemas.microsoft.com/office/drawing/2010/main">
-                <a:solidFill>
-                  <a:srgbClr val="FFFFFF"/>
-                </a:solidFill>
-              </a14:hiddenFill>
-            </a:ext>
-          </a:extLst>
-        </p:spPr>
-      </p:pic>
-      <p:pic>
-        <p:nvPicPr>
-          <p:cNvPr id="1035" name="Picture 11" descr="C:\Users\508-19\Desktop\ㅇ.PNG"/>
-          <p:cNvPicPr>
-            <a:picLocks noChangeAspect="1" noChangeArrowheads="1"/>
-          </p:cNvPicPr>
-          <p:nvPr/>
-        </p:nvPicPr>
-        <p:blipFill>
-          <a:blip r:embed="rId10">
-            <a:extLst>
-              <a:ext uri="{28A0092B-C50C-407E-A947-70E740481C1C}">
-                <a14:useLocalDpi xmlns:a14="http://schemas.microsoft.com/office/drawing/2010/main" val="0"/>
-              </a:ext>
-            </a:extLst>
-          </a:blip>
-          <a:srcRect/>
-          <a:stretch>
-            <a:fillRect/>
-          </a:stretch>
-        </p:blipFill>
-        <p:spPr bwMode="auto">
-          <a:xfrm>
-            <a:off x="6508455" y="1766341"/>
-            <a:ext cx="762000" cy="228600"/>
           </a:xfrm>
           <a:prstGeom prst="rect">
             <a:avLst/>
@@ -10786,7 +10382,7 @@
   <a:extraClrSchemeLst/>
   <a:extLst>
     <a:ext uri="{05A4C25C-085E-4340-85A3-A5531E510DB2}">
-      <thm15:themeFamily xmlns:thm15="http://schemas.microsoft.com/office/thememl/2012/main" xmlns="" name="Office Theme" id="{62F939B6-93AF-4DB8-9C6B-D6C7DFDC589F}" vid="{4A3C46E8-61CC-4603-A589-7422A47A8E4A}"/>
+      <thm15:themeFamily xmlns="" xmlns:thm15="http://schemas.microsoft.com/office/thememl/2012/main" name="Office Theme" id="{62F939B6-93AF-4DB8-9C6B-D6C7DFDC589F}" vid="{4A3C46E8-61CC-4603-A589-7422A47A8E4A}"/>
     </a:ext>
   </a:extLst>
 </a:theme>
@@ -11047,7 +10643,7 @@
   <a:extraClrSchemeLst/>
   <a:extLst>
     <a:ext uri="{05A4C25C-085E-4340-85A3-A5531E510DB2}">
-      <thm15:themeFamily xmlns:thm15="http://schemas.microsoft.com/office/thememl/2012/main" xmlns="" name="Office Theme" id="{62F939B6-93AF-4DB8-9C6B-D6C7DFDC589F}" vid="{4A3C46E8-61CC-4603-A589-7422A47A8E4A}"/>
+      <thm15:themeFamily xmlns="" xmlns:thm15="http://schemas.microsoft.com/office/thememl/2012/main" name="Office Theme" id="{62F939B6-93AF-4DB8-9C6B-D6C7DFDC589F}" vid="{4A3C46E8-61CC-4603-A589-7422A47A8E4A}"/>
     </a:ext>
   </a:extLst>
 </a:theme>
@@ -11308,7 +10904,7 @@
   <a:extraClrSchemeLst/>
   <a:extLst>
     <a:ext uri="{05A4C25C-085E-4340-85A3-A5531E510DB2}">
-      <thm15:themeFamily xmlns:thm15="http://schemas.microsoft.com/office/thememl/2012/main" xmlns="" name="Office Theme" id="{62F939B6-93AF-4DB8-9C6B-D6C7DFDC589F}" vid="{4A3C46E8-61CC-4603-A589-7422A47A8E4A}"/>
+      <thm15:themeFamily xmlns="" xmlns:thm15="http://schemas.microsoft.com/office/thememl/2012/main" name="Office Theme" id="{62F939B6-93AF-4DB8-9C6B-D6C7DFDC589F}" vid="{4A3C46E8-61CC-4603-A589-7422A47A8E4A}"/>
     </a:ext>
   </a:extLst>
 </a:theme>
@@ -11854,7 +11450,7 @@
   <a:extraClrSchemeLst/>
   <a:extLst>
     <a:ext uri="{05A4C25C-085E-4340-85A3-A5531E510DB2}">
-      <thm15:themeFamily xmlns:thm15="http://schemas.microsoft.com/office/thememl/2012/main" xmlns="" name="Office Theme" id="{62F939B6-93AF-4DB8-9C6B-D6C7DFDC589F}" vid="{4A3C46E8-61CC-4603-A589-7422A47A8E4A}"/>
+      <thm15:themeFamily xmlns="" xmlns:thm15="http://schemas.microsoft.com/office/thememl/2012/main" name="Office Theme" id="{62F939B6-93AF-4DB8-9C6B-D6C7DFDC589F}" vid="{4A3C46E8-61CC-4603-A589-7422A47A8E4A}"/>
     </a:ext>
   </a:extLst>
 </a:theme>

</xml_diff>